<commit_message>
Add a photo to the presentation slide
</commit_message>
<xml_diff>
--- a/Big data mining task.pptx
+++ b/Big data mining task.pptx
@@ -110,6 +110,11 @@
       </a:defRPr>
     </a:lvl9pPr>
   </p:defaultTextStyle>
+  <p:extLst>
+    <p:ext uri="{EFAFB233-063F-42B5-8137-9DF3F51BA10A}">
+      <p15:sldGuideLst xmlns:p15="http://schemas.microsoft.com/office/powerpoint/2012/main"/>
+    </p:ext>
+  </p:extLst>
 </p:presentation>
 </file>
 
@@ -283,7 +288,7 @@
             <a:fld id="{87DE6118-2437-4B30-8E3C-4D2BE6020583}" type="datetimeFigureOut">
               <a:rPr lang="en-US" dirty="0"/>
               <a:pPr/>
-              <a:t>12/29/2020</a:t>
+              <a:t>1/19/2021</a:t>
             </a:fld>
             <a:endParaRPr lang="en-US" dirty="0"/>
           </a:p>
@@ -609,7 +614,7 @@
           <a:p>
             <a:fld id="{87DE6118-2437-4B30-8E3C-4D2BE6020583}" type="datetimeFigureOut">
               <a:rPr lang="en-US" dirty="0"/>
-              <a:t>12/29/2020</a:t>
+              <a:t>1/19/2021</a:t>
             </a:fld>
             <a:endParaRPr lang="en-US" dirty="0"/>
           </a:p>
@@ -784,7 +789,7 @@
           <a:p>
             <a:fld id="{87DE6118-2437-4B30-8E3C-4D2BE6020583}" type="datetimeFigureOut">
               <a:rPr lang="en-US" dirty="0"/>
-              <a:t>12/29/2020</a:t>
+              <a:t>1/19/2021</a:t>
             </a:fld>
             <a:endParaRPr lang="en-US" dirty="0"/>
           </a:p>
@@ -949,7 +954,7 @@
           <a:p>
             <a:fld id="{87DE6118-2437-4B30-8E3C-4D2BE6020583}" type="datetimeFigureOut">
               <a:rPr lang="en-US" dirty="0"/>
-              <a:t>12/29/2020</a:t>
+              <a:t>1/19/2021</a:t>
             </a:fld>
             <a:endParaRPr lang="en-US" dirty="0"/>
           </a:p>
@@ -1222,7 +1227,7 @@
             <a:fld id="{87DE6118-2437-4B30-8E3C-4D2BE6020583}" type="datetimeFigureOut">
               <a:rPr lang="en-US" dirty="0"/>
               <a:pPr/>
-              <a:t>12/29/2020</a:t>
+              <a:t>1/19/2021</a:t>
             </a:fld>
             <a:endParaRPr lang="en-US" dirty="0"/>
           </a:p>
@@ -1612,7 +1617,7 @@
           <a:p>
             <a:fld id="{87DE6118-2437-4B30-8E3C-4D2BE6020583}" type="datetimeFigureOut">
               <a:rPr lang="en-US" dirty="0"/>
-              <a:t>12/29/2020</a:t>
+              <a:t>1/19/2021</a:t>
             </a:fld>
             <a:endParaRPr lang="en-US" dirty="0"/>
           </a:p>
@@ -2084,7 +2089,7 @@
           <a:p>
             <a:fld id="{87DE6118-2437-4B30-8E3C-4D2BE6020583}" type="datetimeFigureOut">
               <a:rPr lang="en-US" dirty="0"/>
-              <a:t>12/29/2020</a:t>
+              <a:t>1/19/2021</a:t>
             </a:fld>
             <a:endParaRPr lang="en-US" dirty="0"/>
           </a:p>
@@ -2197,7 +2202,7 @@
           <a:p>
             <a:fld id="{87DE6118-2437-4B30-8E3C-4D2BE6020583}" type="datetimeFigureOut">
               <a:rPr lang="en-US" dirty="0"/>
-              <a:t>12/29/2020</a:t>
+              <a:t>1/19/2021</a:t>
             </a:fld>
             <a:endParaRPr lang="en-US" dirty="0"/>
           </a:p>
@@ -2287,7 +2292,7 @@
           <a:p>
             <a:fld id="{87DE6118-2437-4B30-8E3C-4D2BE6020583}" type="datetimeFigureOut">
               <a:rPr lang="en-US" dirty="0"/>
-              <a:t>12/29/2020</a:t>
+              <a:t>1/19/2021</a:t>
             </a:fld>
             <a:endParaRPr lang="en-US" dirty="0"/>
           </a:p>
@@ -2629,7 +2634,7 @@
             <a:fld id="{87DE6118-2437-4B30-8E3C-4D2BE6020583}" type="datetimeFigureOut">
               <a:rPr lang="en-US" dirty="0"/>
               <a:pPr/>
-              <a:t>12/29/2020</a:t>
+              <a:t>1/19/2021</a:t>
             </a:fld>
             <a:endParaRPr lang="en-US" dirty="0"/>
           </a:p>
@@ -3014,7 +3019,7 @@
             <a:fld id="{87DE6118-2437-4B30-8E3C-4D2BE6020583}" type="datetimeFigureOut">
               <a:rPr lang="en-US" dirty="0"/>
               <a:pPr/>
-              <a:t>12/29/2020</a:t>
+              <a:t>1/19/2021</a:t>
             </a:fld>
             <a:endParaRPr lang="en-US" dirty="0"/>
           </a:p>
@@ -3289,7 +3294,7 @@
             <a:fld id="{87DE6118-2437-4B30-8E3C-4D2BE6020583}" type="datetimeFigureOut">
               <a:rPr lang="en-US" dirty="0"/>
               <a:pPr/>
-              <a:t>12/29/2020</a:t>
+              <a:t>1/19/2021</a:t>
             </a:fld>
             <a:endParaRPr lang="en-US" dirty="0"/>
           </a:p>
@@ -4089,6 +4094,36 @@
           </a:p>
         </p:txBody>
       </p:sp>
+      <p:pic>
+        <p:nvPicPr>
+          <p:cNvPr id="2" name="Picture 1"/>
+          <p:cNvPicPr>
+            <a:picLocks noChangeAspect="1"/>
+          </p:cNvPicPr>
+          <p:nvPr/>
+        </p:nvPicPr>
+        <p:blipFill>
+          <a:blip r:embed="rId4">
+            <a:extLst>
+              <a:ext uri="{28A0092B-C50C-407E-A947-70E740481C1C}">
+                <a14:useLocalDpi xmlns:a14="http://schemas.microsoft.com/office/drawing/2010/main" val="0"/>
+              </a:ext>
+            </a:extLst>
+          </a:blip>
+          <a:stretch>
+            <a:fillRect/>
+          </a:stretch>
+        </p:blipFill>
+        <p:spPr>
+          <a:xfrm>
+            <a:off x="6172200" y="1428750"/>
+            <a:ext cx="5486400" cy="4114800"/>
+          </a:xfrm>
+          <a:prstGeom prst="rect">
+            <a:avLst/>
+          </a:prstGeom>
+        </p:spPr>
+      </p:pic>
     </p:spTree>
     <p:extLst>
       <p:ext uri="{BB962C8B-B14F-4D97-AF65-F5344CB8AC3E}">

</xml_diff>